<commit_message>
1026 refactor: new data source and type, finish import and some scale, still got bug when mask MODIS hdf
</commit_message>
<xml_diff>
--- a/summary.pptx
+++ b/summary.pptx
@@ -7516,7 +7516,7 @@
             </a:r>
             <a:r>
               <a:rPr lang="zh-CN" altLang="en-US" sz="1600" dirty="0"/>
-              <a:t>具体分析？</a:t>
+              <a:t>？待明确</a:t>
             </a:r>
             <a:r>
               <a:rPr lang="en-US" altLang="zh-CN" sz="1600" dirty="0"/>
@@ -8015,7 +8015,7 @@
         <p:spPr>
           <a:xfrm>
             <a:off x="1161837" y="1109279"/>
-            <a:ext cx="7695835" cy="1156086"/>
+            <a:ext cx="7695835" cy="2510303"/>
           </a:xfrm>
           <a:prstGeom prst="rect">
             <a:avLst/>
@@ -8063,10 +8063,25 @@
               <a:buChar char="•"/>
             </a:pPr>
             <a:r>
-              <a:rPr lang="en-US" altLang="zh-CN" sz="1600"/>
-              <a:t>MOD43</a:t>
-            </a:r>
-            <a:endParaRPr lang="en-US" altLang="zh-CN" sz="1600" dirty="0"/>
+              <a:rPr lang="en-US" altLang="zh-CN" sz="1600" dirty="0"/>
+              <a:t>MOD15A2H v061</a:t>
+            </a:r>
+            <a:r>
+              <a:rPr lang="zh-CN" altLang="en-US" sz="1600" dirty="0"/>
+              <a:t>：</a:t>
+            </a:r>
+            <a:r>
+              <a:rPr lang="en-US" altLang="zh-CN" sz="1600" dirty="0"/>
+              <a:t>8</a:t>
+            </a:r>
+            <a:r>
+              <a:rPr lang="zh-CN" altLang="en-US" sz="1600" dirty="0"/>
+              <a:t>天</a:t>
+            </a:r>
+            <a:r>
+              <a:rPr lang="en-US" altLang="zh-CN" sz="1600" dirty="0"/>
+              <a:t>500m LAI</a:t>
+            </a:r>
           </a:p>
           <a:p>
             <a:pPr marL="742950" lvl="1" indent="-285750">
@@ -8080,6 +8095,97 @@
               <a:rPr lang="en-US" altLang="zh-CN" sz="1600" dirty="0"/>
               <a:t>ASTER</a:t>
             </a:r>
+          </a:p>
+          <a:p>
+            <a:pPr marL="1200150" lvl="2" indent="-285750">
+              <a:lnSpc>
+                <a:spcPct val="110000"/>
+              </a:lnSpc>
+              <a:buFont typeface="Arial" panose="020B0604020202020204" pitchFamily="34" charset="0"/>
+              <a:buChar char="•"/>
+            </a:pPr>
+            <a:r>
+              <a:rPr lang="en-US" altLang="zh-CN" sz="1600" dirty="0"/>
+              <a:t>AST_08</a:t>
+            </a:r>
+            <a:r>
+              <a:rPr lang="zh-CN" altLang="en-US" sz="1600" dirty="0"/>
+              <a:t>：</a:t>
+            </a:r>
+            <a:r>
+              <a:rPr lang="en-US" altLang="zh-CN" sz="1600" dirty="0"/>
+              <a:t>90m LST</a:t>
+            </a:r>
+          </a:p>
+          <a:p>
+            <a:pPr marL="1200150" lvl="2" indent="-285750">
+              <a:lnSpc>
+                <a:spcPct val="110000"/>
+              </a:lnSpc>
+              <a:buFont typeface="Arial" panose="020B0604020202020204" pitchFamily="34" charset="0"/>
+              <a:buChar char="•"/>
+            </a:pPr>
+            <a:r>
+              <a:rPr lang="en-US" altLang="zh-CN" sz="1600" dirty="0"/>
+              <a:t>AST_07</a:t>
+            </a:r>
+            <a:r>
+              <a:rPr lang="zh-CN" altLang="en-US" sz="1600" dirty="0"/>
+              <a:t>：</a:t>
+            </a:r>
+            <a:r>
+              <a:rPr lang="en-US" altLang="zh-CN" sz="1600" dirty="0"/>
+              <a:t>15m VNIR</a:t>
+            </a:r>
+            <a:r>
+              <a:rPr lang="zh-CN" altLang="en-US" sz="1600" dirty="0"/>
+              <a:t>反射率</a:t>
+            </a:r>
+            <a:endParaRPr lang="en-US" altLang="zh-CN" sz="1600" dirty="0"/>
+          </a:p>
+          <a:p>
+            <a:pPr marL="742950" lvl="1" indent="-285750">
+              <a:lnSpc>
+                <a:spcPct val="110000"/>
+              </a:lnSpc>
+              <a:buFont typeface="Arial" panose="020B0604020202020204" pitchFamily="34" charset="0"/>
+              <a:buChar char="•"/>
+            </a:pPr>
+            <a:r>
+              <a:rPr lang="zh-CN" altLang="en-US" sz="1600" dirty="0"/>
+              <a:t>聚集指数产品</a:t>
+            </a:r>
+            <a:endParaRPr lang="en-US" altLang="zh-CN" sz="1600" dirty="0"/>
+          </a:p>
+          <a:p>
+            <a:pPr marL="1200150" lvl="2" indent="-285750">
+              <a:lnSpc>
+                <a:spcPct val="110000"/>
+              </a:lnSpc>
+              <a:buFont typeface="Arial" panose="020B0604020202020204" pitchFamily="34" charset="0"/>
+              <a:buChar char="•"/>
+            </a:pPr>
+            <a:r>
+              <a:rPr lang="en-US" altLang="zh-CN" sz="1600" dirty="0"/>
+              <a:t>8</a:t>
+            </a:r>
+            <a:r>
+              <a:rPr lang="zh-CN" altLang="en-US" sz="1600" dirty="0"/>
+              <a:t>天</a:t>
+            </a:r>
+            <a:r>
+              <a:rPr lang="en-US" altLang="zh-CN" sz="1600"/>
+              <a:t>500m CI</a:t>
+            </a:r>
+          </a:p>
+          <a:p>
+            <a:pPr marL="1200150" lvl="2" indent="-285750">
+              <a:lnSpc>
+                <a:spcPct val="110000"/>
+              </a:lnSpc>
+              <a:buFont typeface="Arial" panose="020B0604020202020204" pitchFamily="34" charset="0"/>
+              <a:buChar char="•"/>
+            </a:pPr>
             <a:endParaRPr lang="zh-CN" altLang="en-US" sz="1600" dirty="0"/>
           </a:p>
         </p:txBody>

</xml_diff>

<commit_message>
feat: finish 'main_hdf' and 'main_space' function, now waiting for test result; problem: slow
</commit_message>
<xml_diff>
--- a/summary.pptx
+++ b/summary.pptx
@@ -5,7 +5,7 @@
     <p:sldMasterId id="2147483744" r:id="rId1"/>
   </p:sldMasterIdLst>
   <p:handoutMasterIdLst>
-    <p:handoutMasterId r:id="rId22"/>
+    <p:handoutMasterId r:id="rId23"/>
   </p:handoutMasterIdLst>
   <p:sldIdLst>
     <p:sldId id="256" r:id="rId2"/>
@@ -27,7 +27,8 @@
     <p:sldId id="300" r:id="rId18"/>
     <p:sldId id="301" r:id="rId19"/>
     <p:sldId id="302" r:id="rId20"/>
-    <p:sldId id="267" r:id="rId21"/>
+    <p:sldId id="303" r:id="rId21"/>
+    <p:sldId id="267" r:id="rId22"/>
   </p:sldIdLst>
   <p:sldSz cx="12192000" cy="6858000"/>
   <p:notesSz cx="6858000" cy="9144000"/>
@@ -8174,7 +8175,7 @@
               <a:t>天</a:t>
             </a:r>
             <a:r>
-              <a:rPr lang="en-US" altLang="zh-CN" sz="1600"/>
+              <a:rPr lang="en-US" altLang="zh-CN" sz="1600" dirty="0"/>
               <a:t>500m CI</a:t>
             </a:r>
           </a:p>
@@ -8448,53 +8449,10 @@
       </p:grpSpPr>
       <p:sp>
         <p:nvSpPr>
-          <p:cNvPr id="3" name="内容占位符 2">
-            <a:extLst>
-              <a:ext uri="{FF2B5EF4-FFF2-40B4-BE49-F238E27FC236}">
-                <a16:creationId xmlns:a16="http://schemas.microsoft.com/office/drawing/2014/main" id="{CF7FC132-2164-4FC0-89F2-D6483A307A30}"/>
-              </a:ext>
-            </a:extLst>
-          </p:cNvPr>
-          <p:cNvSpPr>
-            <a:spLocks noGrp="1"/>
-          </p:cNvSpPr>
-          <p:nvPr>
-            <p:ph idx="1"/>
-          </p:nvPr>
-        </p:nvSpPr>
-        <p:spPr>
-          <a:xfrm>
-            <a:off x="1159564" y="2328176"/>
-            <a:ext cx="9872871" cy="1282716"/>
-          </a:xfrm>
-        </p:spPr>
-        <p:txBody>
-          <a:bodyPr>
-            <a:normAutofit/>
-          </a:bodyPr>
-          <a:lstStyle/>
-          <a:p>
-            <a:pPr marL="45720" indent="0" algn="ctr">
-              <a:buNone/>
-            </a:pPr>
-            <a:r>
-              <a:rPr lang="en-US" altLang="zh-CN" sz="8000" b="1" dirty="0">
-                <a:latin typeface="+mj-lt"/>
-              </a:rPr>
-              <a:t>THANK  YOU!</a:t>
-            </a:r>
-            <a:endParaRPr lang="zh-CN" altLang="en-US" sz="8000" b="1" dirty="0">
-              <a:latin typeface="+mj-lt"/>
-            </a:endParaRPr>
-          </a:p>
-        </p:txBody>
-      </p:sp>
-      <p:sp>
-        <p:nvSpPr>
-          <p:cNvPr id="4" name="灯片编号占位符 2">
-            <a:extLst>
-              <a:ext uri="{FF2B5EF4-FFF2-40B4-BE49-F238E27FC236}">
-                <a16:creationId xmlns:a16="http://schemas.microsoft.com/office/drawing/2014/main" id="{2DBEF445-66F5-4498-89E6-C2E89BD5EC65}"/>
+          <p:cNvPr id="21" name="灯片编号占位符 2">
+            <a:extLst>
+              <a:ext uri="{FF2B5EF4-FFF2-40B4-BE49-F238E27FC236}">
+                <a16:creationId xmlns:a16="http://schemas.microsoft.com/office/drawing/2014/main" id="{C4836DD0-0F57-4CA4-88FD-43E44548F974}"/>
               </a:ext>
             </a:extLst>
           </p:cNvPr>
@@ -8527,6 +8485,486 @@
               </a:rPr>
               <a:pPr/>
               <a:t>20</a:t>
+            </a:fld>
+            <a:endParaRPr lang="zh-CN" altLang="en-US" dirty="0">
+              <a:solidFill>
+                <a:schemeClr val="tx1">
+                  <a:lumMod val="65000"/>
+                  <a:lumOff val="35000"/>
+                </a:schemeClr>
+              </a:solidFill>
+              <a:ea typeface="黑体" panose="02010609060101010101" pitchFamily="49" charset="-122"/>
+            </a:endParaRPr>
+          </a:p>
+        </p:txBody>
+      </p:sp>
+      <p:sp>
+        <p:nvSpPr>
+          <p:cNvPr id="3" name="矩形 2">
+            <a:extLst>
+              <a:ext uri="{FF2B5EF4-FFF2-40B4-BE49-F238E27FC236}">
+                <a16:creationId xmlns:a16="http://schemas.microsoft.com/office/drawing/2014/main" id="{C17BD634-ABDE-4406-A636-398471D055C2}"/>
+              </a:ext>
+            </a:extLst>
+          </p:cNvPr>
+          <p:cNvSpPr/>
+          <p:nvPr/>
+        </p:nvSpPr>
+        <p:spPr>
+          <a:xfrm>
+            <a:off x="1485110" y="1453854"/>
+            <a:ext cx="8542810" cy="498663"/>
+          </a:xfrm>
+          <a:prstGeom prst="rect">
+            <a:avLst/>
+          </a:prstGeom>
+        </p:spPr>
+        <p:txBody>
+          <a:bodyPr wrap="square">
+            <a:spAutoFit/>
+          </a:bodyPr>
+          <a:lstStyle/>
+          <a:p>
+            <a:pPr marL="285750" indent="-285750">
+              <a:lnSpc>
+                <a:spcPct val="150000"/>
+              </a:lnSpc>
+              <a:buFont typeface="Arial" panose="020B0604020202020204" pitchFamily="34" charset="0"/>
+              <a:buChar char="•"/>
+            </a:pPr>
+            <a:endParaRPr lang="en-US" altLang="zh-CN" sz="2000" dirty="0"/>
+          </a:p>
+        </p:txBody>
+      </p:sp>
+      <p:sp>
+        <p:nvSpPr>
+          <p:cNvPr id="2" name="文本框 1">
+            <a:extLst>
+              <a:ext uri="{FF2B5EF4-FFF2-40B4-BE49-F238E27FC236}">
+                <a16:creationId xmlns:a16="http://schemas.microsoft.com/office/drawing/2014/main" id="{16DA8A23-1D90-4728-A77B-14ED2190BACA}"/>
+              </a:ext>
+            </a:extLst>
+          </p:cNvPr>
+          <p:cNvSpPr txBox="1"/>
+          <p:nvPr/>
+        </p:nvSpPr>
+        <p:spPr>
+          <a:xfrm>
+            <a:off x="9610166" y="739947"/>
+            <a:ext cx="1223412" cy="369332"/>
+          </a:xfrm>
+          <a:prstGeom prst="rect">
+            <a:avLst/>
+          </a:prstGeom>
+          <a:noFill/>
+        </p:spPr>
+        <p:txBody>
+          <a:bodyPr wrap="none" rtlCol="0">
+            <a:spAutoFit/>
+          </a:bodyPr>
+          <a:lstStyle/>
+          <a:p>
+            <a:r>
+              <a:rPr lang="en-US" altLang="zh-CN" dirty="0"/>
+              <a:t>2021.10.27</a:t>
+            </a:r>
+            <a:endParaRPr lang="zh-CN" altLang="en-US" dirty="0"/>
+          </a:p>
+        </p:txBody>
+      </p:sp>
+      <p:sp>
+        <p:nvSpPr>
+          <p:cNvPr id="11" name="文本框 10">
+            <a:extLst>
+              <a:ext uri="{FF2B5EF4-FFF2-40B4-BE49-F238E27FC236}">
+                <a16:creationId xmlns:a16="http://schemas.microsoft.com/office/drawing/2014/main" id="{7B2BDC68-BF04-4154-9A2C-A687B9532B90}"/>
+              </a:ext>
+            </a:extLst>
+          </p:cNvPr>
+          <p:cNvSpPr txBox="1"/>
+          <p:nvPr/>
+        </p:nvSpPr>
+        <p:spPr>
+          <a:xfrm>
+            <a:off x="1161837" y="1109279"/>
+            <a:ext cx="7695835" cy="2510303"/>
+          </a:xfrm>
+          <a:prstGeom prst="rect">
+            <a:avLst/>
+          </a:prstGeom>
+          <a:noFill/>
+        </p:spPr>
+        <p:txBody>
+          <a:bodyPr wrap="square" rtlCol="0">
+            <a:spAutoFit/>
+          </a:bodyPr>
+          <a:lstStyle/>
+          <a:p>
+            <a:pPr marL="285750" indent="-285750">
+              <a:lnSpc>
+                <a:spcPct val="110000"/>
+              </a:lnSpc>
+              <a:buFont typeface="Arial" panose="020B0604020202020204" pitchFamily="34" charset="0"/>
+              <a:buChar char="•"/>
+            </a:pPr>
+            <a:r>
+              <a:rPr lang="zh-CN" altLang="en-US" sz="1600" dirty="0"/>
+              <a:t>辐亮度对植被覆盖度的敏感性由</a:t>
+            </a:r>
+            <a:r>
+              <a:rPr lang="en-US" altLang="zh-CN" sz="1600" dirty="0"/>
+              <a:t>LSTs</a:t>
+            </a:r>
+            <a:r>
+              <a:rPr lang="zh-CN" altLang="en-US" sz="1600" dirty="0"/>
+              <a:t>与</a:t>
+            </a:r>
+            <a:r>
+              <a:rPr lang="en-US" altLang="zh-CN" sz="1600" dirty="0" err="1"/>
+              <a:t>LSTv</a:t>
+            </a:r>
+            <a:r>
+              <a:rPr lang="zh-CN" altLang="en-US" sz="1600" dirty="0"/>
+              <a:t>的差值决定？</a:t>
+            </a:r>
+            <a:endParaRPr lang="en-US" altLang="zh-CN" sz="1600" dirty="0"/>
+          </a:p>
+          <a:p>
+            <a:pPr marL="742950" lvl="1" indent="-285750">
+              <a:lnSpc>
+                <a:spcPct val="110000"/>
+              </a:lnSpc>
+              <a:buFont typeface="Arial" panose="020B0604020202020204" pitchFamily="34" charset="0"/>
+              <a:buChar char="•"/>
+            </a:pPr>
+            <a:r>
+              <a:rPr lang="zh-CN" altLang="en-US" sz="1600" dirty="0"/>
+              <a:t>对某一个像元，理论上其特征空间中的斜率就取决于</a:t>
+            </a:r>
+            <a:r>
+              <a:rPr lang="en-US" altLang="zh-CN" sz="1600" dirty="0"/>
+              <a:t>LSTs</a:t>
+            </a:r>
+            <a:r>
+              <a:rPr lang="zh-CN" altLang="en-US" sz="1600" dirty="0"/>
+              <a:t>与</a:t>
+            </a:r>
+            <a:r>
+              <a:rPr lang="en-US" altLang="zh-CN" sz="1600" dirty="0" err="1"/>
+              <a:t>LSTv</a:t>
+            </a:r>
+            <a:r>
+              <a:rPr lang="zh-CN" altLang="en-US" sz="1600" dirty="0"/>
+              <a:t>的差值</a:t>
+            </a:r>
+            <a:endParaRPr lang="en-US" altLang="zh-CN" sz="1600" dirty="0"/>
+          </a:p>
+          <a:p>
+            <a:pPr marL="742950" lvl="1" indent="-285750">
+              <a:lnSpc>
+                <a:spcPct val="110000"/>
+              </a:lnSpc>
+              <a:buFont typeface="Arial" panose="020B0604020202020204" pitchFamily="34" charset="0"/>
+              <a:buChar char="•"/>
+            </a:pPr>
+            <a:r>
+              <a:rPr lang="zh-CN" altLang="en-US" sz="1600" dirty="0"/>
+              <a:t>而这个值通常很小</a:t>
+            </a:r>
+            <a:endParaRPr lang="en-US" altLang="zh-CN" sz="1600" dirty="0"/>
+          </a:p>
+          <a:p>
+            <a:pPr marL="742950" lvl="1" indent="-285750">
+              <a:lnSpc>
+                <a:spcPct val="110000"/>
+              </a:lnSpc>
+              <a:buFont typeface="Arial" panose="020B0604020202020204" pitchFamily="34" charset="0"/>
+              <a:buChar char="•"/>
+            </a:pPr>
+            <a:r>
+              <a:rPr lang="zh-CN" altLang="en-US" sz="1600" dirty="0"/>
+              <a:t>但重要的是相对值而不是绝对值？能够在特征空间中形成一定的角度即可</a:t>
+            </a:r>
+            <a:endParaRPr lang="en-US" altLang="zh-CN" sz="1600" dirty="0"/>
+          </a:p>
+          <a:p>
+            <a:pPr marL="285750" indent="-285750">
+              <a:lnSpc>
+                <a:spcPct val="110000"/>
+              </a:lnSpc>
+              <a:buFont typeface="Arial" panose="020B0604020202020204" pitchFamily="34" charset="0"/>
+              <a:buChar char="•"/>
+            </a:pPr>
+            <a:r>
+              <a:rPr lang="zh-CN" altLang="en-US" sz="1600" dirty="0"/>
+              <a:t>新方法中的</a:t>
+            </a:r>
+            <a:r>
+              <a:rPr lang="en-US" altLang="zh-CN" sz="1600" dirty="0"/>
+              <a:t>FVC</a:t>
+            </a:r>
+            <a:r>
+              <a:rPr lang="zh-CN" altLang="en-US" sz="1600" dirty="0"/>
+              <a:t>随角度的变化完全取决于</a:t>
+            </a:r>
+            <a:r>
+              <a:rPr lang="en-US" altLang="zh-CN" sz="1600" dirty="0" err="1"/>
+              <a:t>cosθ</a:t>
+            </a:r>
+            <a:endParaRPr lang="en-US" altLang="zh-CN" sz="1600" dirty="0"/>
+          </a:p>
+          <a:p>
+            <a:pPr marL="742950" lvl="1" indent="-285750">
+              <a:lnSpc>
+                <a:spcPct val="110000"/>
+              </a:lnSpc>
+              <a:buFont typeface="Arial" panose="020B0604020202020204" pitchFamily="34" charset="0"/>
+              <a:buChar char="•"/>
+            </a:pPr>
+            <a:r>
+              <a:rPr lang="zh-CN" altLang="en-US" sz="1600" dirty="0"/>
+              <a:t>没有考虑</a:t>
+            </a:r>
+            <a:r>
+              <a:rPr lang="en-US" altLang="zh-CN" sz="1600" dirty="0"/>
+              <a:t>G</a:t>
+            </a:r>
+            <a:r>
+              <a:rPr lang="zh-CN" altLang="en-US" sz="1600" dirty="0"/>
+              <a:t>随角度的变化</a:t>
+            </a:r>
+            <a:endParaRPr lang="en-US" altLang="zh-CN" sz="1600" dirty="0"/>
+          </a:p>
+          <a:p>
+            <a:pPr marL="1200150" lvl="2" indent="-285750">
+              <a:lnSpc>
+                <a:spcPct val="110000"/>
+              </a:lnSpc>
+              <a:buFont typeface="Arial" panose="020B0604020202020204" pitchFamily="34" charset="0"/>
+              <a:buChar char="•"/>
+            </a:pPr>
+            <a:r>
+              <a:rPr lang="zh-CN" altLang="en-US" sz="1600" dirty="0"/>
+              <a:t>但</a:t>
+            </a:r>
+            <a:r>
+              <a:rPr lang="en-US" altLang="zh-CN" sz="1600" dirty="0"/>
+              <a:t>55-60°</a:t>
+            </a:r>
+            <a:r>
+              <a:rPr lang="zh-CN" altLang="en-US" sz="1600" dirty="0"/>
+              <a:t>确实可以视为定值？</a:t>
+            </a:r>
+            <a:endParaRPr lang="en-US" altLang="zh-CN" sz="1600" dirty="0"/>
+          </a:p>
+          <a:p>
+            <a:pPr marL="742950" lvl="1" indent="-285750">
+              <a:lnSpc>
+                <a:spcPct val="110000"/>
+              </a:lnSpc>
+              <a:buFont typeface="Arial" panose="020B0604020202020204" pitchFamily="34" charset="0"/>
+              <a:buChar char="•"/>
+            </a:pPr>
+            <a:r>
+              <a:rPr lang="zh-CN" altLang="en-US" sz="1600" dirty="0"/>
+              <a:t>理论上可以模拟</a:t>
+            </a:r>
+            <a:r>
+              <a:rPr lang="en-US" altLang="zh-CN" sz="1600" dirty="0"/>
+              <a:t>FVC</a:t>
+            </a:r>
+            <a:r>
+              <a:rPr lang="zh-CN" altLang="en-US" sz="1600" dirty="0"/>
+              <a:t>即辐亮度在任意角度的变化情况，而不局限于特定角度</a:t>
+            </a:r>
+            <a:endParaRPr lang="en-US" altLang="zh-CN" sz="1600" dirty="0"/>
+          </a:p>
+          <a:p>
+            <a:pPr marL="742950" lvl="1" indent="-285750">
+              <a:lnSpc>
+                <a:spcPct val="110000"/>
+              </a:lnSpc>
+              <a:buFont typeface="Arial" panose="020B0604020202020204" pitchFamily="34" charset="0"/>
+              <a:buChar char="•"/>
+            </a:pPr>
+            <a:r>
+              <a:rPr lang="en-US" altLang="zh-CN" sz="1600" dirty="0">
+                <a:solidFill>
+                  <a:srgbClr val="FF0000"/>
+                </a:solidFill>
+              </a:rPr>
+              <a:t>【</a:t>
+            </a:r>
+            <a:r>
+              <a:rPr lang="zh-CN" altLang="en-US" sz="1600" dirty="0">
+                <a:solidFill>
+                  <a:srgbClr val="FF0000"/>
+                </a:solidFill>
+              </a:rPr>
+              <a:t>待思考</a:t>
+            </a:r>
+            <a:r>
+              <a:rPr lang="en-US" altLang="zh-CN" sz="1600" dirty="0">
+                <a:solidFill>
+                  <a:srgbClr val="FF0000"/>
+                </a:solidFill>
+              </a:rPr>
+              <a:t>】</a:t>
+            </a:r>
+            <a:r>
+              <a:rPr lang="zh-CN" altLang="en-US" sz="1600" dirty="0"/>
+              <a:t>模拟过程的内在逻辑</a:t>
+            </a:r>
+          </a:p>
+        </p:txBody>
+      </p:sp>
+      <p:sp>
+        <p:nvSpPr>
+          <p:cNvPr id="12" name="标题 1">
+            <a:extLst>
+              <a:ext uri="{FF2B5EF4-FFF2-40B4-BE49-F238E27FC236}">
+                <a16:creationId xmlns:a16="http://schemas.microsoft.com/office/drawing/2014/main" id="{25222F2F-C9A2-409F-A0C2-70BECF8B5CBB}"/>
+              </a:ext>
+            </a:extLst>
+          </p:cNvPr>
+          <p:cNvSpPr>
+            <a:spLocks noGrp="1"/>
+          </p:cNvSpPr>
+          <p:nvPr>
+            <p:ph type="title"/>
+          </p:nvPr>
+        </p:nvSpPr>
+        <p:spPr>
+          <a:xfrm>
+            <a:off x="436291" y="389082"/>
+            <a:ext cx="5992217" cy="535531"/>
+          </a:xfrm>
+        </p:spPr>
+        <p:txBody>
+          <a:bodyPr wrap="square">
+            <a:spAutoFit/>
+          </a:bodyPr>
+          <a:lstStyle/>
+          <a:p>
+            <a:r>
+              <a:rPr lang="en-US" altLang="zh-CN" sz="3200" dirty="0"/>
+              <a:t>Questions</a:t>
+            </a:r>
+            <a:endParaRPr lang="zh-CN" altLang="en-US" sz="3200" dirty="0"/>
+          </a:p>
+        </p:txBody>
+      </p:sp>
+    </p:spTree>
+    <p:extLst>
+      <p:ext uri="{BB962C8B-B14F-4D97-AF65-F5344CB8AC3E}">
+        <p14:creationId xmlns:p14="http://schemas.microsoft.com/office/powerpoint/2010/main" val="3480623651"/>
+      </p:ext>
+    </p:extLst>
+  </p:cSld>
+  <p:clrMapOvr>
+    <a:masterClrMapping/>
+  </p:clrMapOvr>
+</p:sld>
+</file>
+
+<file path=ppt/slides/slide21.xml><?xml version="1.0" encoding="utf-8"?>
+<p:sld xmlns:a="http://schemas.openxmlformats.org/drawingml/2006/main" xmlns:r="http://schemas.openxmlformats.org/officeDocument/2006/relationships" xmlns:p="http://schemas.openxmlformats.org/presentationml/2006/main">
+  <p:cSld>
+    <p:spTree>
+      <p:nvGrpSpPr>
+        <p:cNvPr id="1" name=""/>
+        <p:cNvGrpSpPr/>
+        <p:nvPr/>
+      </p:nvGrpSpPr>
+      <p:grpSpPr>
+        <a:xfrm>
+          <a:off x="0" y="0"/>
+          <a:ext cx="0" cy="0"/>
+          <a:chOff x="0" y="0"/>
+          <a:chExt cx="0" cy="0"/>
+        </a:xfrm>
+      </p:grpSpPr>
+      <p:sp>
+        <p:nvSpPr>
+          <p:cNvPr id="3" name="内容占位符 2">
+            <a:extLst>
+              <a:ext uri="{FF2B5EF4-FFF2-40B4-BE49-F238E27FC236}">
+                <a16:creationId xmlns:a16="http://schemas.microsoft.com/office/drawing/2014/main" id="{CF7FC132-2164-4FC0-89F2-D6483A307A30}"/>
+              </a:ext>
+            </a:extLst>
+          </p:cNvPr>
+          <p:cNvSpPr>
+            <a:spLocks noGrp="1"/>
+          </p:cNvSpPr>
+          <p:nvPr>
+            <p:ph idx="1"/>
+          </p:nvPr>
+        </p:nvSpPr>
+        <p:spPr>
+          <a:xfrm>
+            <a:off x="1159564" y="2328176"/>
+            <a:ext cx="9872871" cy="1282716"/>
+          </a:xfrm>
+        </p:spPr>
+        <p:txBody>
+          <a:bodyPr>
+            <a:normAutofit/>
+          </a:bodyPr>
+          <a:lstStyle/>
+          <a:p>
+            <a:pPr marL="45720" indent="0" algn="ctr">
+              <a:buNone/>
+            </a:pPr>
+            <a:r>
+              <a:rPr lang="en-US" altLang="zh-CN" sz="8000" b="1" dirty="0">
+                <a:latin typeface="+mj-lt"/>
+              </a:rPr>
+              <a:t>THANK  YOU!</a:t>
+            </a:r>
+            <a:endParaRPr lang="zh-CN" altLang="en-US" sz="8000" b="1" dirty="0">
+              <a:latin typeface="+mj-lt"/>
+            </a:endParaRPr>
+          </a:p>
+        </p:txBody>
+      </p:sp>
+      <p:sp>
+        <p:nvSpPr>
+          <p:cNvPr id="4" name="灯片编号占位符 2">
+            <a:extLst>
+              <a:ext uri="{FF2B5EF4-FFF2-40B4-BE49-F238E27FC236}">
+                <a16:creationId xmlns:a16="http://schemas.microsoft.com/office/drawing/2014/main" id="{2DBEF445-66F5-4498-89E6-C2E89BD5EC65}"/>
+              </a:ext>
+            </a:extLst>
+          </p:cNvPr>
+          <p:cNvSpPr>
+            <a:spLocks noGrp="1"/>
+          </p:cNvSpPr>
+          <p:nvPr>
+            <p:ph type="sldNum" sz="quarter" idx="12"/>
+          </p:nvPr>
+        </p:nvSpPr>
+        <p:spPr>
+          <a:xfrm>
+            <a:off x="9610166" y="6210039"/>
+            <a:ext cx="2133600" cy="365125"/>
+          </a:xfrm>
+        </p:spPr>
+        <p:txBody>
+          <a:bodyPr/>
+          <a:lstStyle/>
+          <a:p>
+            <a:fld id="{1303B071-C02B-492C-A74C-891EA5A07E56}" type="slidenum">
+              <a:rPr lang="zh-CN" altLang="en-US" smtClean="0">
+                <a:solidFill>
+                  <a:schemeClr val="tx1">
+                    <a:lumMod val="65000"/>
+                    <a:lumOff val="35000"/>
+                  </a:schemeClr>
+                </a:solidFill>
+                <a:ea typeface="黑体" panose="02010609060101010101" pitchFamily="49" charset="-122"/>
+              </a:rPr>
+              <a:pPr/>
+              <a:t>21</a:t>
             </a:fld>
             <a:endParaRPr lang="zh-CN" altLang="en-US" dirty="0">
               <a:solidFill>

</xml_diff>